<commit_message>
updated content in models
</commit_message>
<xml_diff>
--- a/Resources/RustModels.pptx
+++ b/Resources/RustModels.pptx
@@ -54,7 +54,7 @@
     <p:sldId id="280" r:id="rId45"/>
   </p:sldIdLst>
   <p:sldSz cx="12192000" cy="6858000"/>
-  <p:notesSz cx="7010400" cy="9296400"/>
+  <p:notesSz cx="9296400" cy="7010400"/>
   <p:defaultTextStyle>
     <a:defPPr>
       <a:defRPr lang="en-US"/>
@@ -192,8 +192,8 @@
         </p:nvSpPr>
         <p:spPr>
           <a:xfrm>
-            <a:off x="0" y="0"/>
-            <a:ext cx="3038475" cy="466725"/>
+            <a:off x="1" y="0"/>
+            <a:ext cx="4029282" cy="351957"/>
           </a:xfrm>
           <a:prstGeom prst="rect">
             <a:avLst/>
@@ -223,8 +223,8 @@
         </p:nvSpPr>
         <p:spPr>
           <a:xfrm>
-            <a:off x="3970338" y="0"/>
-            <a:ext cx="3038475" cy="466725"/>
+            <a:off x="5265014" y="0"/>
+            <a:ext cx="4029282" cy="351957"/>
           </a:xfrm>
           <a:prstGeom prst="rect">
             <a:avLst/>
@@ -240,7 +240,7 @@
           <a:p>
             <a:fld id="{8B9DEAE6-0538-4445-AC69-E9546F37B6FF}" type="datetimeFigureOut">
               <a:rPr lang="en-US" smtClean="0"/>
-              <a:t>3/24/2020</a:t>
+              <a:t>3/25/2020</a:t>
             </a:fld>
             <a:endParaRPr lang="en-US"/>
           </a:p>
@@ -258,8 +258,8 @@
         </p:nvSpPr>
         <p:spPr>
           <a:xfrm>
-            <a:off x="717550" y="1162050"/>
-            <a:ext cx="5575300" cy="3136900"/>
+            <a:off x="2546350" y="876300"/>
+            <a:ext cx="4203700" cy="2365375"/>
           </a:xfrm>
           <a:prstGeom prst="rect">
             <a:avLst/>
@@ -291,8 +291,8 @@
         </p:nvSpPr>
         <p:spPr>
           <a:xfrm>
-            <a:off x="701675" y="4473575"/>
-            <a:ext cx="5607050" cy="3660775"/>
+            <a:off x="930482" y="3373516"/>
+            <a:ext cx="7435436" cy="2760584"/>
           </a:xfrm>
           <a:prstGeom prst="rect">
             <a:avLst/>
@@ -350,8 +350,8 @@
         </p:nvSpPr>
         <p:spPr>
           <a:xfrm>
-            <a:off x="0" y="8829675"/>
-            <a:ext cx="3038475" cy="466725"/>
+            <a:off x="1" y="6658444"/>
+            <a:ext cx="4029282" cy="351957"/>
           </a:xfrm>
           <a:prstGeom prst="rect">
             <a:avLst/>
@@ -381,8 +381,8 @@
         </p:nvSpPr>
         <p:spPr>
           <a:xfrm>
-            <a:off x="3970338" y="8829675"/>
-            <a:ext cx="3038475" cy="466725"/>
+            <a:off x="5265014" y="6658444"/>
+            <a:ext cx="4029282" cy="351957"/>
           </a:xfrm>
           <a:prstGeom prst="rect">
             <a:avLst/>
@@ -654,7 +654,7 @@
           <a:p>
             <a:fld id="{F59BA8CD-9D66-40F3-B663-5AE3FCC8E640}" type="datetime1">
               <a:rPr lang="en-US" smtClean="0"/>
-              <a:t>3/24/2020</a:t>
+              <a:t>3/25/2020</a:t>
             </a:fld>
             <a:endParaRPr lang="en-US"/>
           </a:p>
@@ -852,7 +852,7 @@
           <a:p>
             <a:fld id="{AE815081-8781-4CE2-BA8A-F30EB62592DB}" type="datetime1">
               <a:rPr lang="en-US" smtClean="0"/>
-              <a:t>3/24/2020</a:t>
+              <a:t>3/25/2020</a:t>
             </a:fld>
             <a:endParaRPr lang="en-US"/>
           </a:p>
@@ -1060,7 +1060,7 @@
           <a:p>
             <a:fld id="{1436B19E-3845-4454-9B00-81A37311B2DB}" type="datetime1">
               <a:rPr lang="en-US" smtClean="0"/>
-              <a:t>3/24/2020</a:t>
+              <a:t>3/25/2020</a:t>
             </a:fld>
             <a:endParaRPr lang="en-US"/>
           </a:p>
@@ -1258,7 +1258,7 @@
           <a:p>
             <a:fld id="{51BD0182-F02D-41FA-88F8-DAAE45FECD96}" type="datetime1">
               <a:rPr lang="en-US" smtClean="0"/>
-              <a:t>3/24/2020</a:t>
+              <a:t>3/25/2020</a:t>
             </a:fld>
             <a:endParaRPr lang="en-US"/>
           </a:p>
@@ -1533,7 +1533,7 @@
           <a:p>
             <a:fld id="{97DD5E3A-970B-45DB-AC65-C654B1C83769}" type="datetime1">
               <a:rPr lang="en-US" smtClean="0"/>
-              <a:t>3/24/2020</a:t>
+              <a:t>3/25/2020</a:t>
             </a:fld>
             <a:endParaRPr lang="en-US"/>
           </a:p>
@@ -1798,7 +1798,7 @@
           <a:p>
             <a:fld id="{A0C75F36-CE33-4D01-AEC1-8AE85EBDD5C0}" type="datetime1">
               <a:rPr lang="en-US" smtClean="0"/>
-              <a:t>3/24/2020</a:t>
+              <a:t>3/25/2020</a:t>
             </a:fld>
             <a:endParaRPr lang="en-US"/>
           </a:p>
@@ -2210,7 +2210,7 @@
           <a:p>
             <a:fld id="{2F12ED4E-FBDA-4929-861C-48D0B255396D}" type="datetime1">
               <a:rPr lang="en-US" smtClean="0"/>
-              <a:t>3/24/2020</a:t>
+              <a:t>3/25/2020</a:t>
             </a:fld>
             <a:endParaRPr lang="en-US"/>
           </a:p>
@@ -2351,7 +2351,7 @@
           <a:p>
             <a:fld id="{71274C8E-8698-45E5-8BD5-3125D835571A}" type="datetime1">
               <a:rPr lang="en-US" smtClean="0"/>
-              <a:t>3/24/2020</a:t>
+              <a:t>3/25/2020</a:t>
             </a:fld>
             <a:endParaRPr lang="en-US"/>
           </a:p>
@@ -2464,7 +2464,7 @@
           <a:p>
             <a:fld id="{EAAEADE5-9122-4DD1-9AF9-D9EE601260DA}" type="datetime1">
               <a:rPr lang="en-US" smtClean="0"/>
-              <a:t>3/24/2020</a:t>
+              <a:t>3/25/2020</a:t>
             </a:fld>
             <a:endParaRPr lang="en-US"/>
           </a:p>
@@ -2775,7 +2775,7 @@
           <a:p>
             <a:fld id="{AF0EE2CB-ACA5-4190-BF2E-27B23A7D63ED}" type="datetime1">
               <a:rPr lang="en-US" smtClean="0"/>
-              <a:t>3/24/2020</a:t>
+              <a:t>3/25/2020</a:t>
             </a:fld>
             <a:endParaRPr lang="en-US"/>
           </a:p>
@@ -3063,7 +3063,7 @@
           <a:p>
             <a:fld id="{8071D197-35A9-4BC6-A7E3-13AE8964F43E}" type="datetime1">
               <a:rPr lang="en-US" smtClean="0"/>
-              <a:t>3/24/2020</a:t>
+              <a:t>3/25/2020</a:t>
             </a:fld>
             <a:endParaRPr lang="en-US"/>
           </a:p>
@@ -3304,7 +3304,7 @@
           <a:p>
             <a:fld id="{A6174D4B-69CC-457D-9299-B97313C54882}" type="datetime1">
               <a:rPr lang="en-US" smtClean="0"/>
-              <a:t>3/24/2020</a:t>
+              <a:t>3/25/2020</a:t>
             </a:fld>
             <a:endParaRPr lang="en-US"/>
           </a:p>

</xml_diff>

<commit_message>
fixed error in mut statements
</commit_message>
<xml_diff>
--- a/Resources/RustModels.pptx
+++ b/Resources/RustModels.pptx
@@ -257,7 +257,7 @@
           <a:p>
             <a:fld id="{8B9DEAE6-0538-4445-AC69-E9546F37B6FF}" type="datetimeFigureOut">
               <a:rPr lang="en-US" smtClean="0"/>
-              <a:t>4/13/2020</a:t>
+              <a:t>4/18/2020</a:t>
             </a:fld>
             <a:endParaRPr lang="en-US"/>
           </a:p>
@@ -671,7 +671,7 @@
           <a:p>
             <a:fld id="{F59BA8CD-9D66-40F3-B663-5AE3FCC8E640}" type="datetime1">
               <a:rPr lang="en-US" smtClean="0"/>
-              <a:t>4/13/2020</a:t>
+              <a:t>4/18/2020</a:t>
             </a:fld>
             <a:endParaRPr lang="en-US"/>
           </a:p>
@@ -869,7 +869,7 @@
           <a:p>
             <a:fld id="{AE815081-8781-4CE2-BA8A-F30EB62592DB}" type="datetime1">
               <a:rPr lang="en-US" smtClean="0"/>
-              <a:t>4/13/2020</a:t>
+              <a:t>4/18/2020</a:t>
             </a:fld>
             <a:endParaRPr lang="en-US"/>
           </a:p>
@@ -1077,7 +1077,7 @@
           <a:p>
             <a:fld id="{1436B19E-3845-4454-9B00-81A37311B2DB}" type="datetime1">
               <a:rPr lang="en-US" smtClean="0"/>
-              <a:t>4/13/2020</a:t>
+              <a:t>4/18/2020</a:t>
             </a:fld>
             <a:endParaRPr lang="en-US"/>
           </a:p>
@@ -1285,7 +1285,7 @@
           <a:p>
             <a:fld id="{51BD0182-F02D-41FA-88F8-DAAE45FECD96}" type="datetime1">
               <a:rPr lang="en-US" smtClean="0"/>
-              <a:t>4/13/2020</a:t>
+              <a:t>4/18/2020</a:t>
             </a:fld>
             <a:endParaRPr lang="en-US"/>
           </a:p>
@@ -1565,7 +1565,7 @@
           <a:p>
             <a:fld id="{97DD5E3A-970B-45DB-AC65-C654B1C83769}" type="datetime1">
               <a:rPr lang="en-US" smtClean="0"/>
-              <a:t>4/13/2020</a:t>
+              <a:t>4/18/2020</a:t>
             </a:fld>
             <a:endParaRPr lang="en-US"/>
           </a:p>
@@ -1835,7 +1835,7 @@
           <a:p>
             <a:fld id="{A0C75F36-CE33-4D01-AEC1-8AE85EBDD5C0}" type="datetime1">
               <a:rPr lang="en-US" smtClean="0"/>
-              <a:t>4/13/2020</a:t>
+              <a:t>4/18/2020</a:t>
             </a:fld>
             <a:endParaRPr lang="en-US"/>
           </a:p>
@@ -2252,7 +2252,7 @@
           <a:p>
             <a:fld id="{2F12ED4E-FBDA-4929-861C-48D0B255396D}" type="datetime1">
               <a:rPr lang="en-US" smtClean="0"/>
-              <a:t>4/13/2020</a:t>
+              <a:t>4/18/2020</a:t>
             </a:fld>
             <a:endParaRPr lang="en-US"/>
           </a:p>
@@ -2398,7 +2398,7 @@
           <a:p>
             <a:fld id="{71274C8E-8698-45E5-8BD5-3125D835571A}" type="datetime1">
               <a:rPr lang="en-US" smtClean="0"/>
-              <a:t>4/13/2020</a:t>
+              <a:t>4/18/2020</a:t>
             </a:fld>
             <a:endParaRPr lang="en-US"/>
           </a:p>
@@ -2516,7 +2516,7 @@
           <a:p>
             <a:fld id="{EAAEADE5-9122-4DD1-9AF9-D9EE601260DA}" type="datetime1">
               <a:rPr lang="en-US" smtClean="0"/>
-              <a:t>4/13/2020</a:t>
+              <a:t>4/18/2020</a:t>
             </a:fld>
             <a:endParaRPr lang="en-US"/>
           </a:p>
@@ -2827,7 +2827,7 @@
           <a:p>
             <a:fld id="{AF0EE2CB-ACA5-4190-BF2E-27B23A7D63ED}" type="datetime1">
               <a:rPr lang="en-US" smtClean="0"/>
-              <a:t>4/13/2020</a:t>
+              <a:t>4/18/2020</a:t>
             </a:fld>
             <a:endParaRPr lang="en-US"/>
           </a:p>
@@ -3115,7 +3115,7 @@
           <a:p>
             <a:fld id="{8071D197-35A9-4BC6-A7E3-13AE8964F43E}" type="datetime1">
               <a:rPr lang="en-US" smtClean="0"/>
-              <a:t>4/13/2020</a:t>
+              <a:t>4/18/2020</a:t>
             </a:fld>
             <a:endParaRPr lang="en-US"/>
           </a:p>
@@ -3356,7 +3356,7 @@
           <a:p>
             <a:fld id="{A6174D4B-69CC-457D-9299-B97313C54882}" type="datetime1">
               <a:rPr lang="en-US" smtClean="0"/>
-              <a:t>4/13/2020</a:t>
+              <a:t>4/18/2020</a:t>
             </a:fld>
             <a:endParaRPr lang="en-US"/>
           </a:p>
@@ -8366,7 +8366,7 @@
                 </a:solidFill>
                 <a:latin typeface="Consolas" panose="020B0609020204030204" pitchFamily="49" charset="0"/>
               </a:rPr>
-              <a:t>let r1: &amp;mut String = &amp;mut s;</a:t>
+              <a:t>let mut r1: &amp;String = &amp;s;</a:t>
             </a:r>
           </a:p>
           <a:p>
@@ -8378,7 +8378,7 @@
                 </a:solidFill>
                 <a:latin typeface="Consolas" panose="020B0609020204030204" pitchFamily="49" charset="0"/>
               </a:rPr>
-              <a:t>// let r2: &amp;mut String = &amp;mut s;    // won’t compile</a:t>
+              <a:t>// let mut r2: &amp;String = &amp;s;    // won’t compile</a:t>
             </a:r>
           </a:p>
           <a:p>
@@ -8390,7 +8390,7 @@
                 </a:solidFill>
                 <a:latin typeface="Consolas" panose="020B0609020204030204" pitchFamily="49" charset="0"/>
               </a:rPr>
-              <a:t>// let r3 = &amp;s;                     // won’t compile</a:t>
+              <a:t>// let r3 = &amp;s;                 // won’t compile</a:t>
             </a:r>
           </a:p>
           <a:p>
@@ -8665,7 +8665,7 @@
                 </a:solidFill>
                 <a:latin typeface="Consolas" panose="020B0609020204030204" pitchFamily="49" charset="0"/>
               </a:rPr>
-              <a:t>Let r3 = &amp;mut z;  </a:t>
+              <a:t>Let mut r3 = &amp;z;  </a:t>
             </a:r>
             <a:r>
               <a:rPr lang="en-US" dirty="0"/>

</xml_diff>